<commit_message>
initial versions of payoff matrix in pptx and png
</commit_message>
<xml_diff>
--- a/PDmatrix.pptx
+++ b/PDmatrix.pptx
@@ -3095,600 +3095,890 @@
           <a:chExt cx="0" cy="0"/>
         </a:xfrm>
       </p:grpSpPr>
-      <p:sp>
-        <p:nvSpPr>
-          <p:cNvPr id="4" name="Rectangle 3"/>
-          <p:cNvSpPr/>
+      <p:grpSp>
+        <p:nvGrpSpPr>
+          <p:cNvPr id="11" name="Group 10"/>
+          <p:cNvGrpSpPr/>
           <p:nvPr/>
-        </p:nvSpPr>
-        <p:spPr>
+        </p:nvGrpSpPr>
+        <p:grpSpPr>
           <a:xfrm>
-            <a:off x="2514600" y="1600200"/>
-            <a:ext cx="4572000" cy="4572000"/>
+            <a:off x="1849322" y="495472"/>
+            <a:ext cx="5036642" cy="5040115"/>
+            <a:chOff x="1135558" y="217055"/>
+            <a:chExt cx="5951042" cy="5955145"/>
           </a:xfrm>
-          <a:prstGeom prst="rect">
-            <a:avLst/>
-          </a:prstGeom>
-          <a:solidFill>
-            <a:schemeClr val="bg1"/>
-          </a:solidFill>
-          <a:ln>
+        </p:grpSpPr>
+        <p:sp>
+          <p:nvSpPr>
+            <p:cNvPr id="4" name="Rectangle 3"/>
+            <p:cNvSpPr/>
+            <p:nvPr/>
+          </p:nvSpPr>
+          <p:spPr>
+            <a:xfrm>
+              <a:off x="2514600" y="1600200"/>
+              <a:ext cx="4572000" cy="4572000"/>
+            </a:xfrm>
+            <a:prstGeom prst="rect">
+              <a:avLst/>
+            </a:prstGeom>
             <a:solidFill>
+              <a:schemeClr val="bg1"/>
+            </a:solidFill>
+            <a:ln>
+              <a:solidFill>
+                <a:schemeClr val="tx1"/>
+              </a:solidFill>
+            </a:ln>
+          </p:spPr>
+          <p:style>
+            <a:lnRef idx="2">
+              <a:schemeClr val="accent1">
+                <a:shade val="50000"/>
+              </a:schemeClr>
+            </a:lnRef>
+            <a:fillRef idx="1">
+              <a:schemeClr val="accent1"/>
+            </a:fillRef>
+            <a:effectRef idx="0">
+              <a:schemeClr val="accent1"/>
+            </a:effectRef>
+            <a:fontRef idx="minor">
+              <a:schemeClr val="lt1"/>
+            </a:fontRef>
+          </p:style>
+          <p:txBody>
+            <a:bodyPr rtlCol="0" anchor="ctr"/>
+            <a:lstStyle/>
+            <a:p>
+              <a:pPr algn="ctr"/>
+              <a:endParaRPr lang="en-US" sz="1600"/>
+            </a:p>
+          </p:txBody>
+        </p:sp>
+        <p:cxnSp>
+          <p:nvCxnSpPr>
+            <p:cNvPr id="6" name="Straight Connector 5"/>
+            <p:cNvCxnSpPr>
+              <a:stCxn id="4" idx="0"/>
+              <a:endCxn id="4" idx="2"/>
+            </p:cNvCxnSpPr>
+            <p:nvPr/>
+          </p:nvCxnSpPr>
+          <p:spPr>
+            <a:xfrm>
+              <a:off x="4800600" y="1600200"/>
+              <a:ext cx="0" cy="4572000"/>
+            </a:xfrm>
+            <a:prstGeom prst="line">
+              <a:avLst/>
+            </a:prstGeom>
+            <a:ln w="25400">
+              <a:solidFill>
+                <a:schemeClr val="tx1"/>
+              </a:solidFill>
+            </a:ln>
+          </p:spPr>
+          <p:style>
+            <a:lnRef idx="1">
+              <a:schemeClr val="accent1"/>
+            </a:lnRef>
+            <a:fillRef idx="0">
+              <a:schemeClr val="accent1"/>
+            </a:fillRef>
+            <a:effectRef idx="0">
+              <a:schemeClr val="accent1"/>
+            </a:effectRef>
+            <a:fontRef idx="minor">
               <a:schemeClr val="tx1"/>
-            </a:solidFill>
-          </a:ln>
-        </p:spPr>
-        <p:style>
-          <a:lnRef idx="2">
-            <a:schemeClr val="accent1">
-              <a:shade val="50000"/>
-            </a:schemeClr>
-          </a:lnRef>
-          <a:fillRef idx="1">
-            <a:schemeClr val="accent1"/>
-          </a:fillRef>
-          <a:effectRef idx="0">
-            <a:schemeClr val="accent1"/>
-          </a:effectRef>
-          <a:fontRef idx="minor">
-            <a:schemeClr val="lt1"/>
-          </a:fontRef>
-        </p:style>
-        <p:txBody>
-          <a:bodyPr rtlCol="0" anchor="ctr"/>
-          <a:lstStyle/>
-          <a:p>
-            <a:pPr algn="ctr"/>
-            <a:endParaRPr lang="en-US"/>
-          </a:p>
-        </p:txBody>
-      </p:sp>
-      <p:cxnSp>
-        <p:nvCxnSpPr>
-          <p:cNvPr id="6" name="Straight Connector 5"/>
-          <p:cNvCxnSpPr>
-            <a:stCxn id="4" idx="0"/>
-            <a:endCxn id="4" idx="2"/>
-          </p:cNvCxnSpPr>
-          <p:nvPr/>
-        </p:nvCxnSpPr>
-        <p:spPr>
-          <a:xfrm>
-            <a:off x="4800600" y="1600200"/>
-            <a:ext cx="0" cy="4572000"/>
-          </a:xfrm>
-          <a:prstGeom prst="line">
-            <a:avLst/>
-          </a:prstGeom>
-          <a:ln w="25400">
-            <a:solidFill>
+            </a:fontRef>
+          </p:style>
+        </p:cxnSp>
+        <p:cxnSp>
+          <p:nvCxnSpPr>
+            <p:cNvPr id="8" name="Straight Connector 7"/>
+            <p:cNvCxnSpPr>
+              <a:stCxn id="4" idx="1"/>
+              <a:endCxn id="4" idx="3"/>
+            </p:cNvCxnSpPr>
+            <p:nvPr/>
+          </p:nvCxnSpPr>
+          <p:spPr>
+            <a:xfrm>
+              <a:off x="2514600" y="3886200"/>
+              <a:ext cx="4572000" cy="0"/>
+            </a:xfrm>
+            <a:prstGeom prst="line">
+              <a:avLst/>
+            </a:prstGeom>
+            <a:ln w="25400">
+              <a:solidFill>
+                <a:schemeClr val="tx1"/>
+              </a:solidFill>
+            </a:ln>
+          </p:spPr>
+          <p:style>
+            <a:lnRef idx="1">
+              <a:schemeClr val="accent1"/>
+            </a:lnRef>
+            <a:fillRef idx="0">
+              <a:schemeClr val="accent1"/>
+            </a:fillRef>
+            <a:effectRef idx="0">
+              <a:schemeClr val="accent1"/>
+            </a:effectRef>
+            <a:fontRef idx="minor">
               <a:schemeClr val="tx1"/>
-            </a:solidFill>
-          </a:ln>
-        </p:spPr>
-        <p:style>
-          <a:lnRef idx="1">
-            <a:schemeClr val="accent1"/>
-          </a:lnRef>
-          <a:fillRef idx="0">
-            <a:schemeClr val="accent1"/>
-          </a:fillRef>
-          <a:effectRef idx="0">
-            <a:schemeClr val="accent1"/>
-          </a:effectRef>
-          <a:fontRef idx="minor">
-            <a:schemeClr val="tx1"/>
-          </a:fontRef>
-        </p:style>
-      </p:cxnSp>
-      <p:cxnSp>
-        <p:nvCxnSpPr>
-          <p:cNvPr id="8" name="Straight Connector 7"/>
-          <p:cNvCxnSpPr>
-            <a:stCxn id="4" idx="1"/>
-            <a:endCxn id="4" idx="3"/>
-          </p:cNvCxnSpPr>
-          <p:nvPr/>
-        </p:nvCxnSpPr>
-        <p:spPr>
-          <a:xfrm>
-            <a:off x="2514600" y="3886200"/>
-            <a:ext cx="4572000" cy="0"/>
-          </a:xfrm>
-          <a:prstGeom prst="line">
-            <a:avLst/>
-          </a:prstGeom>
-          <a:ln w="25400">
-            <a:solidFill>
+            </a:fontRef>
+          </p:style>
+        </p:cxnSp>
+        <p:cxnSp>
+          <p:nvCxnSpPr>
+            <p:cNvPr id="10" name="Straight Connector 9"/>
+            <p:cNvCxnSpPr/>
+            <p:nvPr/>
+          </p:nvCxnSpPr>
+          <p:spPr>
+            <a:xfrm>
+              <a:off x="2514600" y="1600200"/>
+              <a:ext cx="4572000" cy="4572000"/>
+            </a:xfrm>
+            <a:prstGeom prst="line">
+              <a:avLst/>
+            </a:prstGeom>
+            <a:ln w="25400">
+              <a:solidFill>
+                <a:schemeClr val="tx1"/>
+              </a:solidFill>
+            </a:ln>
+          </p:spPr>
+          <p:style>
+            <a:lnRef idx="1">
+              <a:schemeClr val="accent1"/>
+            </a:lnRef>
+            <a:fillRef idx="0">
+              <a:schemeClr val="accent1"/>
+            </a:fillRef>
+            <a:effectRef idx="0">
+              <a:schemeClr val="accent1"/>
+            </a:effectRef>
+            <a:fontRef idx="minor">
               <a:schemeClr val="tx1"/>
-            </a:solidFill>
-          </a:ln>
-        </p:spPr>
-        <p:style>
-          <a:lnRef idx="1">
-            <a:schemeClr val="accent1"/>
-          </a:lnRef>
-          <a:fillRef idx="0">
-            <a:schemeClr val="accent1"/>
-          </a:fillRef>
-          <a:effectRef idx="0">
-            <a:schemeClr val="accent1"/>
-          </a:effectRef>
-          <a:fontRef idx="minor">
-            <a:schemeClr val="tx1"/>
-          </a:fontRef>
-        </p:style>
-      </p:cxnSp>
-      <p:cxnSp>
-        <p:nvCxnSpPr>
-          <p:cNvPr id="10" name="Straight Connector 9"/>
-          <p:cNvCxnSpPr/>
-          <p:nvPr/>
-        </p:nvCxnSpPr>
-        <p:spPr>
-          <a:xfrm>
-            <a:off x="2514600" y="1600200"/>
-            <a:ext cx="4572000" cy="4572000"/>
-          </a:xfrm>
-          <a:prstGeom prst="line">
-            <a:avLst/>
-          </a:prstGeom>
-          <a:ln w="25400">
-            <a:solidFill>
+            </a:fontRef>
+          </p:style>
+        </p:cxnSp>
+        <p:cxnSp>
+          <p:nvCxnSpPr>
+            <p:cNvPr id="12" name="Straight Connector 11"/>
+            <p:cNvCxnSpPr>
+              <a:stCxn id="4" idx="1"/>
+              <a:endCxn id="4" idx="2"/>
+            </p:cNvCxnSpPr>
+            <p:nvPr/>
+          </p:nvCxnSpPr>
+          <p:spPr>
+            <a:xfrm>
+              <a:off x="2514600" y="3886200"/>
+              <a:ext cx="2286000" cy="2286000"/>
+            </a:xfrm>
+            <a:prstGeom prst="line">
+              <a:avLst/>
+            </a:prstGeom>
+            <a:ln w="25400">
+              <a:solidFill>
+                <a:schemeClr val="tx1"/>
+              </a:solidFill>
+            </a:ln>
+          </p:spPr>
+          <p:style>
+            <a:lnRef idx="1">
+              <a:schemeClr val="accent1"/>
+            </a:lnRef>
+            <a:fillRef idx="0">
+              <a:schemeClr val="accent1"/>
+            </a:fillRef>
+            <a:effectRef idx="0">
+              <a:schemeClr val="accent1"/>
+            </a:effectRef>
+            <a:fontRef idx="minor">
               <a:schemeClr val="tx1"/>
-            </a:solidFill>
-          </a:ln>
-        </p:spPr>
-        <p:style>
-          <a:lnRef idx="1">
-            <a:schemeClr val="accent1"/>
-          </a:lnRef>
-          <a:fillRef idx="0">
-            <a:schemeClr val="accent1"/>
-          </a:fillRef>
-          <a:effectRef idx="0">
-            <a:schemeClr val="accent1"/>
-          </a:effectRef>
-          <a:fontRef idx="minor">
-            <a:schemeClr val="tx1"/>
-          </a:fontRef>
-        </p:style>
-      </p:cxnSp>
-      <p:cxnSp>
-        <p:nvCxnSpPr>
-          <p:cNvPr id="12" name="Straight Connector 11"/>
-          <p:cNvCxnSpPr>
-            <a:stCxn id="4" idx="1"/>
-            <a:endCxn id="4" idx="2"/>
-          </p:cNvCxnSpPr>
-          <p:nvPr/>
-        </p:nvCxnSpPr>
-        <p:spPr>
-          <a:xfrm>
-            <a:off x="2514600" y="3886200"/>
-            <a:ext cx="2286000" cy="2286000"/>
-          </a:xfrm>
-          <a:prstGeom prst="line">
-            <a:avLst/>
-          </a:prstGeom>
-          <a:ln w="25400">
-            <a:solidFill>
+            </a:fontRef>
+          </p:style>
+        </p:cxnSp>
+        <p:cxnSp>
+          <p:nvCxnSpPr>
+            <p:cNvPr id="14" name="Straight Connector 13"/>
+            <p:cNvCxnSpPr>
+              <a:stCxn id="4" idx="0"/>
+              <a:endCxn id="4" idx="3"/>
+            </p:cNvCxnSpPr>
+            <p:nvPr/>
+          </p:nvCxnSpPr>
+          <p:spPr>
+            <a:xfrm>
+              <a:off x="4800600" y="1600200"/>
+              <a:ext cx="2286000" cy="2286000"/>
+            </a:xfrm>
+            <a:prstGeom prst="line">
+              <a:avLst/>
+            </a:prstGeom>
+            <a:ln w="25400">
+              <a:solidFill>
+                <a:schemeClr val="tx1"/>
+              </a:solidFill>
+            </a:ln>
+          </p:spPr>
+          <p:style>
+            <a:lnRef idx="1">
+              <a:schemeClr val="accent1"/>
+            </a:lnRef>
+            <a:fillRef idx="0">
+              <a:schemeClr val="accent1"/>
+            </a:fillRef>
+            <a:effectRef idx="0">
+              <a:schemeClr val="accent1"/>
+            </a:effectRef>
+            <a:fontRef idx="minor">
               <a:schemeClr val="tx1"/>
-            </a:solidFill>
-          </a:ln>
-        </p:spPr>
-        <p:style>
-          <a:lnRef idx="1">
-            <a:schemeClr val="accent1"/>
-          </a:lnRef>
-          <a:fillRef idx="0">
-            <a:schemeClr val="accent1"/>
-          </a:fillRef>
-          <a:effectRef idx="0">
-            <a:schemeClr val="accent1"/>
-          </a:effectRef>
-          <a:fontRef idx="minor">
-            <a:schemeClr val="tx1"/>
-          </a:fontRef>
-        </p:style>
-      </p:cxnSp>
-      <p:cxnSp>
-        <p:nvCxnSpPr>
-          <p:cNvPr id="14" name="Straight Connector 13"/>
-          <p:cNvCxnSpPr>
-            <a:stCxn id="4" idx="0"/>
-            <a:endCxn id="4" idx="3"/>
-          </p:cNvCxnSpPr>
-          <p:nvPr/>
-        </p:nvCxnSpPr>
-        <p:spPr>
-          <a:xfrm>
-            <a:off x="4800600" y="1600200"/>
-            <a:ext cx="2286000" cy="2286000"/>
-          </a:xfrm>
-          <a:prstGeom prst="line">
-            <a:avLst/>
-          </a:prstGeom>
-          <a:ln w="25400">
-            <a:solidFill>
-              <a:schemeClr val="tx1"/>
-            </a:solidFill>
-          </a:ln>
-        </p:spPr>
-        <p:style>
-          <a:lnRef idx="1">
-            <a:schemeClr val="accent1"/>
-          </a:lnRef>
-          <a:fillRef idx="0">
-            <a:schemeClr val="accent1"/>
-          </a:fillRef>
-          <a:effectRef idx="0">
-            <a:schemeClr val="accent1"/>
-          </a:effectRef>
-          <a:fontRef idx="minor">
-            <a:schemeClr val="tx1"/>
-          </a:fontRef>
-        </p:style>
-      </p:cxnSp>
-      <p:sp>
-        <p:nvSpPr>
-          <p:cNvPr id="15" name="TextBox 14"/>
-          <p:cNvSpPr txBox="1"/>
-          <p:nvPr/>
-        </p:nvSpPr>
-        <p:spPr>
-          <a:xfrm>
-            <a:off x="3120902" y="838200"/>
-            <a:ext cx="513282" cy="830997"/>
-          </a:xfrm>
-          <a:prstGeom prst="rect">
-            <a:avLst/>
-          </a:prstGeom>
-          <a:noFill/>
-        </p:spPr>
-        <p:txBody>
-          <a:bodyPr wrap="none" rtlCol="0">
-            <a:spAutoFit/>
-          </a:bodyPr>
-          <a:lstStyle/>
-          <a:p>
-            <a:r>
-              <a:rPr lang="en-US" sz="4800" dirty="0" smtClean="0"/>
-              <a:t>C</a:t>
-            </a:r>
-            <a:endParaRPr lang="en-US" sz="4800" dirty="0"/>
-          </a:p>
-        </p:txBody>
-      </p:sp>
-      <p:sp>
-        <p:nvSpPr>
-          <p:cNvPr id="16" name="TextBox 15"/>
-          <p:cNvSpPr txBox="1"/>
-          <p:nvPr/>
-        </p:nvSpPr>
-        <p:spPr>
-          <a:xfrm>
-            <a:off x="5806375" y="838200"/>
-            <a:ext cx="562975" cy="830997"/>
-          </a:xfrm>
-          <a:prstGeom prst="rect">
-            <a:avLst/>
-          </a:prstGeom>
-          <a:noFill/>
-        </p:spPr>
-        <p:txBody>
-          <a:bodyPr wrap="none" rtlCol="0">
-            <a:spAutoFit/>
-          </a:bodyPr>
-          <a:lstStyle/>
-          <a:p>
-            <a:r>
-              <a:rPr lang="en-US" sz="4800" dirty="0" smtClean="0"/>
-              <a:t>D</a:t>
-            </a:r>
-            <a:endParaRPr lang="en-US" sz="4800" dirty="0"/>
-          </a:p>
-        </p:txBody>
-      </p:sp>
-      <p:sp>
-        <p:nvSpPr>
-          <p:cNvPr id="17" name="TextBox 16"/>
-          <p:cNvSpPr txBox="1"/>
-          <p:nvPr/>
-        </p:nvSpPr>
-        <p:spPr>
-          <a:xfrm>
-            <a:off x="1981200" y="2286000"/>
-            <a:ext cx="513282" cy="830997"/>
-          </a:xfrm>
-          <a:prstGeom prst="rect">
-            <a:avLst/>
-          </a:prstGeom>
-          <a:noFill/>
-        </p:spPr>
-        <p:txBody>
-          <a:bodyPr wrap="none" rtlCol="0">
-            <a:spAutoFit/>
-          </a:bodyPr>
-          <a:lstStyle/>
-          <a:p>
-            <a:r>
-              <a:rPr lang="en-US" sz="4800" dirty="0" smtClean="0"/>
-              <a:t>C</a:t>
-            </a:r>
-            <a:endParaRPr lang="en-US" sz="4800" dirty="0"/>
-          </a:p>
-        </p:txBody>
-      </p:sp>
-      <p:sp>
-        <p:nvSpPr>
-          <p:cNvPr id="18" name="TextBox 17"/>
-          <p:cNvSpPr txBox="1"/>
-          <p:nvPr/>
-        </p:nvSpPr>
-        <p:spPr>
-          <a:xfrm>
-            <a:off x="1981200" y="4768211"/>
-            <a:ext cx="562975" cy="830997"/>
-          </a:xfrm>
-          <a:prstGeom prst="rect">
-            <a:avLst/>
-          </a:prstGeom>
-          <a:noFill/>
-        </p:spPr>
-        <p:txBody>
-          <a:bodyPr wrap="none" rtlCol="0">
-            <a:spAutoFit/>
-          </a:bodyPr>
-          <a:lstStyle/>
-          <a:p>
-            <a:r>
-              <a:rPr lang="en-US" sz="4800" dirty="0" smtClean="0"/>
-              <a:t>D</a:t>
-            </a:r>
-            <a:endParaRPr lang="en-US" sz="4800" dirty="0"/>
-          </a:p>
-        </p:txBody>
-      </p:sp>
-      <p:sp>
-        <p:nvSpPr>
-          <p:cNvPr id="19" name="TextBox 18"/>
-          <p:cNvSpPr txBox="1"/>
-          <p:nvPr/>
-        </p:nvSpPr>
-        <p:spPr>
-          <a:xfrm>
-            <a:off x="3886200" y="1828800"/>
-            <a:ext cx="497252" cy="830997"/>
-          </a:xfrm>
-          <a:prstGeom prst="rect">
-            <a:avLst/>
-          </a:prstGeom>
-          <a:noFill/>
-        </p:spPr>
-        <p:txBody>
-          <a:bodyPr wrap="none" rtlCol="0">
-            <a:spAutoFit/>
-          </a:bodyPr>
-          <a:lstStyle/>
-          <a:p>
-            <a:r>
-              <a:rPr lang="en-US" sz="4800" dirty="0"/>
-              <a:t>7</a:t>
-            </a:r>
-            <a:endParaRPr lang="en-US" sz="4800" dirty="0"/>
-          </a:p>
-        </p:txBody>
-      </p:sp>
-      <p:sp>
-        <p:nvSpPr>
-          <p:cNvPr id="20" name="TextBox 19"/>
-          <p:cNvSpPr txBox="1"/>
-          <p:nvPr/>
-        </p:nvSpPr>
-        <p:spPr>
-          <a:xfrm>
-            <a:off x="2971800" y="2659797"/>
-            <a:ext cx="497252" cy="830997"/>
-          </a:xfrm>
-          <a:prstGeom prst="rect">
-            <a:avLst/>
-          </a:prstGeom>
-          <a:noFill/>
-        </p:spPr>
-        <p:txBody>
-          <a:bodyPr wrap="none" rtlCol="0">
-            <a:spAutoFit/>
-          </a:bodyPr>
-          <a:lstStyle/>
-          <a:p>
-            <a:r>
-              <a:rPr lang="en-US" sz="4800" dirty="0"/>
-              <a:t>7</a:t>
-            </a:r>
-            <a:endParaRPr lang="en-US" sz="4800" dirty="0"/>
-          </a:p>
-        </p:txBody>
-      </p:sp>
-      <p:sp>
-        <p:nvSpPr>
-          <p:cNvPr id="21" name="TextBox 20"/>
-          <p:cNvSpPr txBox="1"/>
-          <p:nvPr/>
-        </p:nvSpPr>
-        <p:spPr>
-          <a:xfrm>
-            <a:off x="6084041" y="1824182"/>
-            <a:ext cx="809837" cy="830997"/>
-          </a:xfrm>
-          <a:prstGeom prst="rect">
-            <a:avLst/>
-          </a:prstGeom>
-          <a:noFill/>
-        </p:spPr>
-        <p:txBody>
-          <a:bodyPr wrap="none" rtlCol="0">
-            <a:spAutoFit/>
-          </a:bodyPr>
-          <a:lstStyle/>
-          <a:p>
-            <a:r>
-              <a:rPr lang="en-US" sz="4800" dirty="0" smtClean="0"/>
-              <a:t>10</a:t>
-            </a:r>
-            <a:endParaRPr lang="en-US" sz="4800" dirty="0"/>
-          </a:p>
-        </p:txBody>
-      </p:sp>
-      <p:sp>
-        <p:nvSpPr>
-          <p:cNvPr id="22" name="TextBox 21"/>
-          <p:cNvSpPr txBox="1"/>
-          <p:nvPr/>
-        </p:nvSpPr>
-        <p:spPr>
-          <a:xfrm>
-            <a:off x="5309123" y="2738582"/>
-            <a:ext cx="497252" cy="830997"/>
-          </a:xfrm>
-          <a:prstGeom prst="rect">
-            <a:avLst/>
-          </a:prstGeom>
-          <a:noFill/>
-        </p:spPr>
-        <p:txBody>
-          <a:bodyPr wrap="none" rtlCol="0">
-            <a:spAutoFit/>
-          </a:bodyPr>
-          <a:lstStyle/>
-          <a:p>
-            <a:r>
-              <a:rPr lang="en-US" sz="4800" dirty="0" smtClean="0"/>
-              <a:t>0</a:t>
-            </a:r>
-            <a:endParaRPr lang="en-US" sz="4800" dirty="0"/>
-          </a:p>
-        </p:txBody>
-      </p:sp>
-      <p:sp>
-        <p:nvSpPr>
-          <p:cNvPr id="23" name="TextBox 22"/>
-          <p:cNvSpPr txBox="1"/>
-          <p:nvPr/>
-        </p:nvSpPr>
-        <p:spPr>
-          <a:xfrm>
-            <a:off x="3729907" y="4114800"/>
-            <a:ext cx="497252" cy="830997"/>
-          </a:xfrm>
-          <a:prstGeom prst="rect">
-            <a:avLst/>
-          </a:prstGeom>
-          <a:noFill/>
-        </p:spPr>
-        <p:txBody>
-          <a:bodyPr wrap="none" rtlCol="0">
-            <a:spAutoFit/>
-          </a:bodyPr>
-          <a:lstStyle/>
-          <a:p>
-            <a:r>
-              <a:rPr lang="en-US" sz="4800" dirty="0" smtClean="0"/>
-              <a:t>0</a:t>
-            </a:r>
-            <a:endParaRPr lang="en-US" sz="4800" dirty="0"/>
-          </a:p>
-        </p:txBody>
-      </p:sp>
-      <p:sp>
-        <p:nvSpPr>
-          <p:cNvPr id="24" name="TextBox 23"/>
-          <p:cNvSpPr txBox="1"/>
-          <p:nvPr/>
-        </p:nvSpPr>
-        <p:spPr>
-          <a:xfrm>
-            <a:off x="2954989" y="5029200"/>
-            <a:ext cx="809837" cy="830997"/>
-          </a:xfrm>
-          <a:prstGeom prst="rect">
-            <a:avLst/>
-          </a:prstGeom>
-          <a:noFill/>
-        </p:spPr>
-        <p:txBody>
-          <a:bodyPr wrap="none" rtlCol="0">
-            <a:spAutoFit/>
-          </a:bodyPr>
-          <a:lstStyle/>
-          <a:p>
-            <a:r>
-              <a:rPr lang="en-US" sz="4800" dirty="0" smtClean="0"/>
-              <a:t>10</a:t>
-            </a:r>
-            <a:endParaRPr lang="en-US" sz="4800" dirty="0"/>
-          </a:p>
-        </p:txBody>
-      </p:sp>
-      <p:sp>
-        <p:nvSpPr>
-          <p:cNvPr id="25" name="TextBox 24"/>
-          <p:cNvSpPr txBox="1"/>
-          <p:nvPr/>
-        </p:nvSpPr>
-        <p:spPr>
-          <a:xfrm>
-            <a:off x="5958775" y="4198203"/>
-            <a:ext cx="497252" cy="830997"/>
-          </a:xfrm>
-          <a:prstGeom prst="rect">
-            <a:avLst/>
-          </a:prstGeom>
-          <a:noFill/>
-        </p:spPr>
-        <p:txBody>
-          <a:bodyPr wrap="none" rtlCol="0">
-            <a:spAutoFit/>
-          </a:bodyPr>
-          <a:lstStyle/>
-          <a:p>
-            <a:r>
-              <a:rPr lang="en-US" sz="4800" dirty="0"/>
-              <a:t>3</a:t>
-            </a:r>
-          </a:p>
-        </p:txBody>
-      </p:sp>
-      <p:sp>
-        <p:nvSpPr>
-          <p:cNvPr id="26" name="TextBox 25"/>
-          <p:cNvSpPr txBox="1"/>
-          <p:nvPr/>
-        </p:nvSpPr>
-        <p:spPr>
-          <a:xfrm>
-            <a:off x="5183857" y="5112603"/>
-            <a:ext cx="497252" cy="830997"/>
-          </a:xfrm>
-          <a:prstGeom prst="rect">
-            <a:avLst/>
-          </a:prstGeom>
-          <a:noFill/>
-        </p:spPr>
-        <p:txBody>
-          <a:bodyPr wrap="none" rtlCol="0">
-            <a:spAutoFit/>
-          </a:bodyPr>
-          <a:lstStyle/>
-          <a:p>
-            <a:r>
-              <a:rPr lang="en-US" sz="4800" dirty="0"/>
-              <a:t>3</a:t>
-            </a:r>
-            <a:endParaRPr lang="en-US" sz="4800" dirty="0"/>
-          </a:p>
-        </p:txBody>
-      </p:sp>
+            </a:fontRef>
+          </p:style>
+        </p:cxnSp>
+        <p:sp>
+          <p:nvSpPr>
+            <p:cNvPr id="15" name="TextBox 14"/>
+            <p:cNvSpPr txBox="1"/>
+            <p:nvPr/>
+          </p:nvSpPr>
+          <p:spPr>
+            <a:xfrm>
+              <a:off x="3387132" y="752904"/>
+              <a:ext cx="486030" cy="769442"/>
+            </a:xfrm>
+            <a:prstGeom prst="rect">
+              <a:avLst/>
+            </a:prstGeom>
+            <a:noFill/>
+          </p:spPr>
+          <p:txBody>
+            <a:bodyPr wrap="none" rtlCol="0">
+              <a:spAutoFit/>
+            </a:bodyPr>
+            <a:lstStyle/>
+            <a:p>
+              <a:pPr algn="ctr"/>
+              <a:r>
+                <a:rPr lang="en-US" sz="4400" dirty="0" smtClean="0">
+                  <a:solidFill>
+                    <a:schemeClr val="accent5">
+                      <a:lumMod val="75000"/>
+                    </a:schemeClr>
+                  </a:solidFill>
+                </a:rPr>
+                <a:t>C</a:t>
+              </a:r>
+              <a:endParaRPr lang="en-US" sz="4400" dirty="0">
+                <a:solidFill>
+                  <a:schemeClr val="accent5">
+                    <a:lumMod val="75000"/>
+                  </a:schemeClr>
+                </a:solidFill>
+              </a:endParaRPr>
+            </a:p>
+          </p:txBody>
+        </p:sp>
+        <p:sp>
+          <p:nvSpPr>
+            <p:cNvPr id="16" name="TextBox 15"/>
+            <p:cNvSpPr txBox="1"/>
+            <p:nvPr/>
+          </p:nvSpPr>
+          <p:spPr>
+            <a:xfrm>
+              <a:off x="5772609" y="752904"/>
+              <a:ext cx="532518" cy="769442"/>
+            </a:xfrm>
+            <a:prstGeom prst="rect">
+              <a:avLst/>
+            </a:prstGeom>
+            <a:noFill/>
+          </p:spPr>
+          <p:txBody>
+            <a:bodyPr wrap="none" rtlCol="0">
+              <a:spAutoFit/>
+            </a:bodyPr>
+            <a:lstStyle/>
+            <a:p>
+              <a:pPr algn="ctr"/>
+              <a:r>
+                <a:rPr lang="en-US" sz="4400" dirty="0" smtClean="0">
+                  <a:solidFill>
+                    <a:schemeClr val="accent5">
+                      <a:lumMod val="75000"/>
+                    </a:schemeClr>
+                  </a:solidFill>
+                </a:rPr>
+                <a:t>D</a:t>
+              </a:r>
+              <a:endParaRPr lang="en-US" sz="4400" dirty="0">
+                <a:solidFill>
+                  <a:schemeClr val="accent5">
+                    <a:lumMod val="75000"/>
+                  </a:schemeClr>
+                </a:solidFill>
+              </a:endParaRPr>
+            </a:p>
+          </p:txBody>
+        </p:sp>
+        <p:sp>
+          <p:nvSpPr>
+            <p:cNvPr id="17" name="TextBox 16"/>
+            <p:cNvSpPr txBox="1"/>
+            <p:nvPr/>
+          </p:nvSpPr>
+          <p:spPr>
+            <a:xfrm>
+              <a:off x="1842426" y="2262841"/>
+              <a:ext cx="486030" cy="769441"/>
+            </a:xfrm>
+            <a:prstGeom prst="rect">
+              <a:avLst/>
+            </a:prstGeom>
+            <a:noFill/>
+          </p:spPr>
+          <p:txBody>
+            <a:bodyPr wrap="none" rtlCol="0">
+              <a:spAutoFit/>
+            </a:bodyPr>
+            <a:lstStyle/>
+            <a:p>
+              <a:pPr algn="ctr"/>
+              <a:r>
+                <a:rPr lang="en-US" sz="4400" dirty="0" smtClean="0">
+                  <a:solidFill>
+                    <a:schemeClr val="accent2">
+                      <a:lumMod val="75000"/>
+                    </a:schemeClr>
+                  </a:solidFill>
+                </a:rPr>
+                <a:t>C</a:t>
+              </a:r>
+              <a:endParaRPr lang="en-US" sz="4400" dirty="0">
+                <a:solidFill>
+                  <a:schemeClr val="accent2">
+                    <a:lumMod val="75000"/>
+                  </a:schemeClr>
+                </a:solidFill>
+              </a:endParaRPr>
+            </a:p>
+          </p:txBody>
+        </p:sp>
+        <p:sp>
+          <p:nvSpPr>
+            <p:cNvPr id="18" name="TextBox 17"/>
+            <p:cNvSpPr txBox="1"/>
+            <p:nvPr/>
+          </p:nvSpPr>
+          <p:spPr>
+            <a:xfrm>
+              <a:off x="1844029" y="4613702"/>
+              <a:ext cx="532518" cy="769441"/>
+            </a:xfrm>
+            <a:prstGeom prst="rect">
+              <a:avLst/>
+            </a:prstGeom>
+            <a:noFill/>
+          </p:spPr>
+          <p:txBody>
+            <a:bodyPr wrap="none" rtlCol="0">
+              <a:spAutoFit/>
+            </a:bodyPr>
+            <a:lstStyle/>
+            <a:p>
+              <a:pPr algn="ctr"/>
+              <a:r>
+                <a:rPr lang="en-US" sz="4400" dirty="0" smtClean="0">
+                  <a:solidFill>
+                    <a:schemeClr val="accent2">
+                      <a:lumMod val="75000"/>
+                    </a:schemeClr>
+                  </a:solidFill>
+                </a:rPr>
+                <a:t>D</a:t>
+              </a:r>
+              <a:endParaRPr lang="en-US" sz="4400" dirty="0">
+                <a:solidFill>
+                  <a:schemeClr val="accent2">
+                    <a:lumMod val="75000"/>
+                  </a:schemeClr>
+                </a:solidFill>
+              </a:endParaRPr>
+            </a:p>
+          </p:txBody>
+        </p:sp>
+        <p:grpSp>
+          <p:nvGrpSpPr>
+            <p:cNvPr id="2" name="Group 1"/>
+            <p:cNvGrpSpPr/>
+            <p:nvPr/>
+          </p:nvGrpSpPr>
+          <p:grpSpPr>
+            <a:xfrm>
+              <a:off x="3046761" y="1826491"/>
+              <a:ext cx="1166772" cy="1642140"/>
+              <a:chOff x="3124907" y="1826491"/>
+              <a:chExt cx="1166772" cy="1642140"/>
+            </a:xfrm>
+          </p:grpSpPr>
+          <p:sp>
+            <p:nvSpPr>
+              <p:cNvPr id="19" name="TextBox 18"/>
+              <p:cNvSpPr txBox="1"/>
+              <p:nvPr/>
+            </p:nvSpPr>
+            <p:spPr>
+              <a:xfrm>
+                <a:off x="3821679" y="1826491"/>
+                <a:ext cx="470000" cy="769441"/>
+              </a:xfrm>
+              <a:prstGeom prst="rect">
+                <a:avLst/>
+              </a:prstGeom>
+              <a:noFill/>
+            </p:spPr>
+            <p:txBody>
+              <a:bodyPr wrap="none" rtlCol="0">
+                <a:spAutoFit/>
+              </a:bodyPr>
+              <a:lstStyle/>
+              <a:p>
+                <a:pPr algn="ctr"/>
+                <a:r>
+                  <a:rPr lang="en-US" sz="4400" dirty="0">
+                    <a:solidFill>
+                      <a:schemeClr val="accent5">
+                        <a:lumMod val="75000"/>
+                      </a:schemeClr>
+                    </a:solidFill>
+                  </a:rPr>
+                  <a:t>7</a:t>
+                </a:r>
+              </a:p>
+            </p:txBody>
+          </p:sp>
+          <p:sp>
+            <p:nvSpPr>
+              <p:cNvPr id="20" name="TextBox 19"/>
+              <p:cNvSpPr txBox="1"/>
+              <p:nvPr/>
+            </p:nvSpPr>
+            <p:spPr>
+              <a:xfrm>
+                <a:off x="3124907" y="2699190"/>
+                <a:ext cx="470000" cy="769441"/>
+              </a:xfrm>
+              <a:prstGeom prst="rect">
+                <a:avLst/>
+              </a:prstGeom>
+              <a:noFill/>
+            </p:spPr>
+            <p:txBody>
+              <a:bodyPr wrap="none" rtlCol="0">
+                <a:spAutoFit/>
+              </a:bodyPr>
+              <a:lstStyle/>
+              <a:p>
+                <a:pPr algn="ctr"/>
+                <a:r>
+                  <a:rPr lang="en-US" sz="4400" dirty="0">
+                    <a:solidFill>
+                      <a:schemeClr val="accent2">
+                        <a:lumMod val="75000"/>
+                      </a:schemeClr>
+                    </a:solidFill>
+                  </a:rPr>
+                  <a:t>7</a:t>
+                </a:r>
+              </a:p>
+            </p:txBody>
+          </p:sp>
+        </p:grpSp>
+        <p:grpSp>
+          <p:nvGrpSpPr>
+            <p:cNvPr id="3" name="Group 2"/>
+            <p:cNvGrpSpPr/>
+            <p:nvPr/>
+          </p:nvGrpSpPr>
+          <p:grpSpPr>
+            <a:xfrm>
+              <a:off x="5260116" y="1826491"/>
+              <a:ext cx="1543878" cy="1642140"/>
+              <a:chOff x="5260116" y="1826491"/>
+              <a:chExt cx="1543878" cy="1642140"/>
+            </a:xfrm>
+          </p:grpSpPr>
+          <p:sp>
+            <p:nvSpPr>
+              <p:cNvPr id="21" name="TextBox 20"/>
+              <p:cNvSpPr txBox="1"/>
+              <p:nvPr/>
+            </p:nvSpPr>
+            <p:spPr>
+              <a:xfrm>
+                <a:off x="6048659" y="1826491"/>
+                <a:ext cx="755335" cy="769441"/>
+              </a:xfrm>
+              <a:prstGeom prst="rect">
+                <a:avLst/>
+              </a:prstGeom>
+              <a:noFill/>
+            </p:spPr>
+            <p:txBody>
+              <a:bodyPr wrap="none" rtlCol="0">
+                <a:spAutoFit/>
+              </a:bodyPr>
+              <a:lstStyle/>
+              <a:p>
+                <a:pPr algn="ctr"/>
+                <a:r>
+                  <a:rPr lang="en-US" sz="4400" dirty="0" smtClean="0">
+                    <a:solidFill>
+                      <a:schemeClr val="accent5">
+                        <a:lumMod val="75000"/>
+                      </a:schemeClr>
+                    </a:solidFill>
+                  </a:rPr>
+                  <a:t>10</a:t>
+                </a:r>
+                <a:endParaRPr lang="en-US" sz="4400" dirty="0">
+                  <a:solidFill>
+                    <a:schemeClr val="accent5">
+                      <a:lumMod val="75000"/>
+                    </a:schemeClr>
+                  </a:solidFill>
+                </a:endParaRPr>
+              </a:p>
+            </p:txBody>
+          </p:sp>
+          <p:sp>
+            <p:nvSpPr>
+              <p:cNvPr id="22" name="TextBox 21"/>
+              <p:cNvSpPr txBox="1"/>
+              <p:nvPr/>
+            </p:nvSpPr>
+            <p:spPr>
+              <a:xfrm>
+                <a:off x="5260116" y="2699190"/>
+                <a:ext cx="470000" cy="769441"/>
+              </a:xfrm>
+              <a:prstGeom prst="rect">
+                <a:avLst/>
+              </a:prstGeom>
+              <a:noFill/>
+            </p:spPr>
+            <p:txBody>
+              <a:bodyPr wrap="none" rtlCol="0">
+                <a:spAutoFit/>
+              </a:bodyPr>
+              <a:lstStyle/>
+              <a:p>
+                <a:pPr algn="ctr"/>
+                <a:r>
+                  <a:rPr lang="en-US" sz="4400" dirty="0" smtClean="0">
+                    <a:solidFill>
+                      <a:schemeClr val="accent2">
+                        <a:lumMod val="75000"/>
+                      </a:schemeClr>
+                    </a:solidFill>
+                  </a:rPr>
+                  <a:t>0</a:t>
+                </a:r>
+                <a:endParaRPr lang="en-US" sz="4400" dirty="0">
+                  <a:solidFill>
+                    <a:schemeClr val="accent2">
+                      <a:lumMod val="75000"/>
+                    </a:schemeClr>
+                  </a:solidFill>
+                </a:endParaRPr>
+              </a:p>
+            </p:txBody>
+          </p:sp>
+        </p:grpSp>
+        <p:grpSp>
+          <p:nvGrpSpPr>
+            <p:cNvPr id="5" name="Group 4"/>
+            <p:cNvGrpSpPr/>
+            <p:nvPr/>
+          </p:nvGrpSpPr>
+          <p:grpSpPr>
+            <a:xfrm>
+              <a:off x="2982240" y="4156502"/>
+              <a:ext cx="1309439" cy="1683841"/>
+              <a:chOff x="2982240" y="4156502"/>
+              <a:chExt cx="1309439" cy="1683841"/>
+            </a:xfrm>
+          </p:grpSpPr>
+          <p:sp>
+            <p:nvSpPr>
+              <p:cNvPr id="23" name="TextBox 22"/>
+              <p:cNvSpPr txBox="1"/>
+              <p:nvPr/>
+            </p:nvSpPr>
+            <p:spPr>
+              <a:xfrm>
+                <a:off x="3821679" y="4156502"/>
+                <a:ext cx="470000" cy="769441"/>
+              </a:xfrm>
+              <a:prstGeom prst="rect">
+                <a:avLst/>
+              </a:prstGeom>
+              <a:noFill/>
+            </p:spPr>
+            <p:txBody>
+              <a:bodyPr wrap="none" rtlCol="0">
+                <a:spAutoFit/>
+              </a:bodyPr>
+              <a:lstStyle/>
+              <a:p>
+                <a:pPr algn="ctr"/>
+                <a:r>
+                  <a:rPr lang="en-US" sz="4400" dirty="0" smtClean="0">
+                    <a:solidFill>
+                      <a:schemeClr val="accent5">
+                        <a:lumMod val="75000"/>
+                      </a:schemeClr>
+                    </a:solidFill>
+                  </a:rPr>
+                  <a:t>0</a:t>
+                </a:r>
+                <a:endParaRPr lang="en-US" sz="4400" dirty="0">
+                  <a:solidFill>
+                    <a:schemeClr val="accent5">
+                      <a:lumMod val="75000"/>
+                    </a:schemeClr>
+                  </a:solidFill>
+                </a:endParaRPr>
+              </a:p>
+            </p:txBody>
+          </p:sp>
+          <p:sp>
+            <p:nvSpPr>
+              <p:cNvPr id="24" name="TextBox 23"/>
+              <p:cNvSpPr txBox="1"/>
+              <p:nvPr/>
+            </p:nvSpPr>
+            <p:spPr>
+              <a:xfrm>
+                <a:off x="2982240" y="5070902"/>
+                <a:ext cx="755335" cy="769441"/>
+              </a:xfrm>
+              <a:prstGeom prst="rect">
+                <a:avLst/>
+              </a:prstGeom>
+              <a:noFill/>
+            </p:spPr>
+            <p:txBody>
+              <a:bodyPr wrap="none" rtlCol="0">
+                <a:spAutoFit/>
+              </a:bodyPr>
+              <a:lstStyle/>
+              <a:p>
+                <a:pPr algn="ctr"/>
+                <a:r>
+                  <a:rPr lang="en-US" sz="4400" dirty="0" smtClean="0">
+                    <a:solidFill>
+                      <a:schemeClr val="accent2">
+                        <a:lumMod val="75000"/>
+                      </a:schemeClr>
+                    </a:solidFill>
+                  </a:rPr>
+                  <a:t>10</a:t>
+                </a:r>
+                <a:endParaRPr lang="en-US" sz="4400" dirty="0">
+                  <a:solidFill>
+                    <a:schemeClr val="accent2">
+                      <a:lumMod val="75000"/>
+                    </a:schemeClr>
+                  </a:solidFill>
+                </a:endParaRPr>
+              </a:p>
+            </p:txBody>
+          </p:sp>
+        </p:grpSp>
+        <p:grpSp>
+          <p:nvGrpSpPr>
+            <p:cNvPr id="7" name="Group 6"/>
+            <p:cNvGrpSpPr/>
+            <p:nvPr/>
+          </p:nvGrpSpPr>
+          <p:grpSpPr>
+            <a:xfrm>
+              <a:off x="5338262" y="4156502"/>
+              <a:ext cx="1401210" cy="1683841"/>
+              <a:chOff x="5260116" y="4156502"/>
+              <a:chExt cx="1401210" cy="1683841"/>
+            </a:xfrm>
+          </p:grpSpPr>
+          <p:sp>
+            <p:nvSpPr>
+              <p:cNvPr id="25" name="TextBox 24"/>
+              <p:cNvSpPr txBox="1"/>
+              <p:nvPr/>
+            </p:nvSpPr>
+            <p:spPr>
+              <a:xfrm>
+                <a:off x="6191326" y="4156502"/>
+                <a:ext cx="470000" cy="769441"/>
+              </a:xfrm>
+              <a:prstGeom prst="rect">
+                <a:avLst/>
+              </a:prstGeom>
+              <a:noFill/>
+            </p:spPr>
+            <p:txBody>
+              <a:bodyPr wrap="none" rtlCol="0">
+                <a:spAutoFit/>
+              </a:bodyPr>
+              <a:lstStyle/>
+              <a:p>
+                <a:pPr algn="ctr"/>
+                <a:r>
+                  <a:rPr lang="en-US" sz="4400" dirty="0">
+                    <a:solidFill>
+                      <a:schemeClr val="accent5">
+                        <a:lumMod val="75000"/>
+                      </a:schemeClr>
+                    </a:solidFill>
+                  </a:rPr>
+                  <a:t>3</a:t>
+                </a:r>
+              </a:p>
+            </p:txBody>
+          </p:sp>
+          <p:sp>
+            <p:nvSpPr>
+              <p:cNvPr id="26" name="TextBox 25"/>
+              <p:cNvSpPr txBox="1"/>
+              <p:nvPr/>
+            </p:nvSpPr>
+            <p:spPr>
+              <a:xfrm>
+                <a:off x="5260116" y="5070902"/>
+                <a:ext cx="470000" cy="769441"/>
+              </a:xfrm>
+              <a:prstGeom prst="rect">
+                <a:avLst/>
+              </a:prstGeom>
+              <a:noFill/>
+            </p:spPr>
+            <p:txBody>
+              <a:bodyPr wrap="none" rtlCol="0">
+                <a:spAutoFit/>
+              </a:bodyPr>
+              <a:lstStyle/>
+              <a:p>
+                <a:pPr algn="ctr"/>
+                <a:r>
+                  <a:rPr lang="en-US" sz="4400" dirty="0">
+                    <a:solidFill>
+                      <a:schemeClr val="accent2">
+                        <a:lumMod val="75000"/>
+                      </a:schemeClr>
+                    </a:solidFill>
+                  </a:rPr>
+                  <a:t>3</a:t>
+                </a:r>
+              </a:p>
+            </p:txBody>
+          </p:sp>
+        </p:grpSp>
+        <p:sp>
+          <p:nvSpPr>
+            <p:cNvPr id="27" name="TextBox 26"/>
+            <p:cNvSpPr txBox="1"/>
+            <p:nvPr/>
+          </p:nvSpPr>
+          <p:spPr>
+            <a:xfrm>
+              <a:off x="3955463" y="217055"/>
+              <a:ext cx="1837619" cy="707886"/>
+            </a:xfrm>
+            <a:prstGeom prst="rect">
+              <a:avLst/>
+            </a:prstGeom>
+            <a:noFill/>
+          </p:spPr>
+          <p:txBody>
+            <a:bodyPr wrap="none" rtlCol="0">
+              <a:spAutoFit/>
+            </a:bodyPr>
+            <a:lstStyle/>
+            <a:p>
+              <a:pPr algn="ctr"/>
+              <a:r>
+                <a:rPr lang="en-US" sz="4000" dirty="0" smtClean="0">
+                  <a:solidFill>
+                    <a:schemeClr val="accent5">
+                      <a:lumMod val="75000"/>
+                    </a:schemeClr>
+                  </a:solidFill>
+                </a:rPr>
+                <a:t>Player 1</a:t>
+              </a:r>
+              <a:endParaRPr lang="en-US" sz="4000" dirty="0">
+                <a:solidFill>
+                  <a:schemeClr val="accent5">
+                    <a:lumMod val="75000"/>
+                  </a:schemeClr>
+                </a:solidFill>
+              </a:endParaRPr>
+            </a:p>
+          </p:txBody>
+        </p:sp>
+        <p:sp>
+          <p:nvSpPr>
+            <p:cNvPr id="28" name="TextBox 27"/>
+            <p:cNvSpPr txBox="1"/>
+            <p:nvPr/>
+          </p:nvSpPr>
+          <p:spPr>
+            <a:xfrm rot="16200000">
+              <a:off x="570691" y="3474810"/>
+              <a:ext cx="1837619" cy="707886"/>
+            </a:xfrm>
+            <a:prstGeom prst="rect">
+              <a:avLst/>
+            </a:prstGeom>
+            <a:noFill/>
+          </p:spPr>
+          <p:txBody>
+            <a:bodyPr wrap="none" rtlCol="0">
+              <a:spAutoFit/>
+            </a:bodyPr>
+            <a:lstStyle/>
+            <a:p>
+              <a:pPr algn="ctr"/>
+              <a:r>
+                <a:rPr lang="en-US" sz="4000" dirty="0" smtClean="0">
+                  <a:solidFill>
+                    <a:schemeClr val="accent2">
+                      <a:lumMod val="75000"/>
+                    </a:schemeClr>
+                  </a:solidFill>
+                </a:rPr>
+                <a:t>Player 2</a:t>
+              </a:r>
+              <a:endParaRPr lang="en-US" sz="4000" dirty="0">
+                <a:solidFill>
+                  <a:schemeClr val="accent2">
+                    <a:lumMod val="75000"/>
+                  </a:schemeClr>
+                </a:solidFill>
+              </a:endParaRPr>
+            </a:p>
+          </p:txBody>
+        </p:sp>
+      </p:grpSp>
     </p:spTree>
     <p:extLst>
       <p:ext uri="{BB962C8B-B14F-4D97-AF65-F5344CB8AC3E}">

</xml_diff>